<commit_message>
Data Science / Week 6
</commit_message>
<xml_diff>
--- a/Week 5/Week 5 Slides.pptx
+++ b/Week 5/Week 5 Slides.pptx
@@ -5,7 +5,7 @@
     <p:sldMasterId id="2147483648" r:id="rId1"/>
   </p:sldMasterIdLst>
   <p:notesMasterIdLst>
-    <p:notesMasterId r:id="rId46"/>
+    <p:notesMasterId r:id="rId47"/>
   </p:notesMasterIdLst>
   <p:sldIdLst>
     <p:sldId id="256" r:id="rId2"/>
@@ -52,6 +52,7 @@
     <p:sldId id="293" r:id="rId43"/>
     <p:sldId id="294" r:id="rId44"/>
     <p:sldId id="303" r:id="rId45"/>
+    <p:sldId id="304" r:id="rId46"/>
   </p:sldIdLst>
   <p:sldSz cx="12192000" cy="6858000"/>
   <p:notesSz cx="6858000" cy="9144000"/>
@@ -554,7 +555,22 @@
           <a:p>
             <a:r>
               <a:rPr lang="en-US" dirty="0" smtClean="0"/>
-              <a:t>[Go</a:t>
+              <a:t>[Go through Quiz]</a:t>
+            </a:r>
+            <a:r>
+              <a:rPr lang="en-US" baseline="0" dirty="0" smtClean="0"/>
+              <a:t> Quiz URL is also in </a:t>
+            </a:r>
+            <a:r>
+              <a:rPr lang="en-US" baseline="0" dirty="0" err="1" smtClean="0"/>
+              <a:t>Exercises.ipynb</a:t>
+            </a:r>
+            <a:endParaRPr lang="en-US" dirty="0" smtClean="0"/>
+          </a:p>
+          <a:p>
+            <a:r>
+              <a:rPr lang="en-US" dirty="0" smtClean="0"/>
+              <a:t>Go</a:t>
             </a:r>
             <a:r>
               <a:rPr lang="en-US" baseline="0" dirty="0" smtClean="0"/>
@@ -3360,7 +3376,7 @@
             </a:r>
             <a:r>
               <a:rPr lang="en-US" baseline="0" dirty="0" smtClean="0"/>
-              <a:t> down the “Classes” notebook until you hit this point</a:t>
+              <a:t> down the “Classes” notebook until you hit this point. Explain encapsulation with TV remote analogy.</a:t>
             </a:r>
             <a:endParaRPr lang="en-US" dirty="0"/>
           </a:p>
@@ -3563,6 +3579,12 @@
           <a:bodyPr/>
           <a:lstStyle/>
           <a:p>
+            <a:r>
+              <a:rPr lang="en-US" dirty="0" smtClean="0"/>
+              <a:t>And let’s try to work through Alarms</a:t>
+            </a:r>
+          </a:p>
+          <a:p>
             <a:endParaRPr lang="en-US" dirty="0"/>
           </a:p>
         </p:txBody>
@@ -3594,6 +3616,96 @@
     <p:extLst>
       <p:ext uri="{BB962C8B-B14F-4D97-AF65-F5344CB8AC3E}">
         <p14:creationId xmlns:p14="http://schemas.microsoft.com/office/powerpoint/2010/main" val="1511035973"/>
+      </p:ext>
+    </p:extLst>
+  </p:cSld>
+  <p:clrMapOvr>
+    <a:masterClrMapping/>
+  </p:clrMapOvr>
+</p:notes>
+</file>
+
+<file path=ppt/notesSlides/notesSlide39.xml><?xml version="1.0" encoding="utf-8"?>
+<p:notes xmlns:a="http://schemas.openxmlformats.org/drawingml/2006/main" xmlns:r="http://schemas.openxmlformats.org/officeDocument/2006/relationships" xmlns:p="http://schemas.openxmlformats.org/presentationml/2006/main">
+  <p:cSld>
+    <p:spTree>
+      <p:nvGrpSpPr>
+        <p:cNvPr id="1" name=""/>
+        <p:cNvGrpSpPr/>
+        <p:nvPr/>
+      </p:nvGrpSpPr>
+      <p:grpSpPr>
+        <a:xfrm>
+          <a:off x="0" y="0"/>
+          <a:ext cx="0" cy="0"/>
+          <a:chOff x="0" y="0"/>
+          <a:chExt cx="0" cy="0"/>
+        </a:xfrm>
+      </p:grpSpPr>
+      <p:sp>
+        <p:nvSpPr>
+          <p:cNvPr id="2" name="Slide Image Placeholder 1"/>
+          <p:cNvSpPr>
+            <a:spLocks noGrp="1" noRot="1" noChangeAspect="1"/>
+          </p:cNvSpPr>
+          <p:nvPr>
+            <p:ph type="sldImg"/>
+          </p:nvPr>
+        </p:nvSpPr>
+        <p:spPr/>
+      </p:sp>
+      <p:sp>
+        <p:nvSpPr>
+          <p:cNvPr id="3" name="Notes Placeholder 2"/>
+          <p:cNvSpPr>
+            <a:spLocks noGrp="1"/>
+          </p:cNvSpPr>
+          <p:nvPr>
+            <p:ph type="body" idx="1"/>
+          </p:nvPr>
+        </p:nvSpPr>
+        <p:spPr/>
+        <p:txBody>
+          <a:bodyPr/>
+          <a:lstStyle/>
+          <a:p>
+            <a:r>
+              <a:rPr lang="en-US" dirty="0" smtClean="0"/>
+              <a:t>And let’s try to work through Alarms</a:t>
+            </a:r>
+          </a:p>
+          <a:p>
+            <a:endParaRPr lang="en-US" dirty="0"/>
+          </a:p>
+        </p:txBody>
+      </p:sp>
+      <p:sp>
+        <p:nvSpPr>
+          <p:cNvPr id="4" name="Slide Number Placeholder 3"/>
+          <p:cNvSpPr>
+            <a:spLocks noGrp="1"/>
+          </p:cNvSpPr>
+          <p:nvPr>
+            <p:ph type="sldNum" sz="quarter" idx="10"/>
+          </p:nvPr>
+        </p:nvSpPr>
+        <p:spPr/>
+        <p:txBody>
+          <a:bodyPr/>
+          <a:lstStyle/>
+          <a:p>
+            <a:fld id="{A2A96CE4-4593-BD4E-ACFD-4AA346581587}" type="slidenum">
+              <a:rPr lang="en-US" smtClean="0"/>
+              <a:t>45</a:t>
+            </a:fld>
+            <a:endParaRPr lang="en-US"/>
+          </a:p>
+        </p:txBody>
+      </p:sp>
+    </p:spTree>
+    <p:extLst>
+      <p:ext uri="{BB962C8B-B14F-4D97-AF65-F5344CB8AC3E}">
+        <p14:creationId xmlns:p14="http://schemas.microsoft.com/office/powerpoint/2010/main" val="1359549504"/>
       </p:ext>
     </p:extLst>
   </p:cSld>
@@ -7146,6 +7258,13 @@
   <p:clrMapOvr>
     <a:masterClrMapping/>
   </p:clrMapOvr>
+  <p:timing>
+    <p:tnLst>
+      <p:par>
+        <p:cTn id="1" dur="indefinite" restart="never" nodeType="tmRoot"/>
+      </p:par>
+    </p:tnLst>
+  </p:timing>
 </p:sld>
 </file>
 
@@ -7322,6 +7441,13 @@
   <p:clrMapOvr>
     <a:masterClrMapping/>
   </p:clrMapOvr>
+  <p:timing>
+    <p:tnLst>
+      <p:par>
+        <p:cTn id="1" dur="indefinite" restart="never" nodeType="tmRoot"/>
+      </p:par>
+    </p:tnLst>
+  </p:timing>
 </p:sld>
 </file>
 
@@ -7498,6 +7624,13 @@
   <p:clrMapOvr>
     <a:masterClrMapping/>
   </p:clrMapOvr>
+  <p:timing>
+    <p:tnLst>
+      <p:par>
+        <p:cTn id="1" dur="indefinite" restart="never" nodeType="tmRoot"/>
+      </p:par>
+    </p:tnLst>
+  </p:timing>
 </p:sld>
 </file>
 
@@ -7674,6 +7807,13 @@
   <p:clrMapOvr>
     <a:masterClrMapping/>
   </p:clrMapOvr>
+  <p:timing>
+    <p:tnLst>
+      <p:par>
+        <p:cTn id="1" dur="indefinite" restart="never" nodeType="tmRoot"/>
+      </p:par>
+    </p:tnLst>
+  </p:timing>
 </p:sld>
 </file>
 
@@ -7807,6 +7947,13 @@
   <p:clrMapOvr>
     <a:masterClrMapping/>
   </p:clrMapOvr>
+  <p:timing>
+    <p:tnLst>
+      <p:par>
+        <p:cTn id="1" dur="indefinite" restart="never" nodeType="tmRoot"/>
+      </p:par>
+    </p:tnLst>
+  </p:timing>
 </p:sld>
 </file>
 
@@ -8081,6 +8228,13 @@
   <p:clrMapOvr>
     <a:masterClrMapping/>
   </p:clrMapOvr>
+  <p:timing>
+    <p:tnLst>
+      <p:par>
+        <p:cTn id="1" dur="indefinite" restart="never" nodeType="tmRoot"/>
+      </p:par>
+    </p:tnLst>
+  </p:timing>
 </p:sld>
 </file>
 
@@ -9007,6 +9161,13 @@
   <p:clrMapOvr>
     <a:masterClrMapping/>
   </p:clrMapOvr>
+  <p:timing>
+    <p:tnLst>
+      <p:par>
+        <p:cTn id="1" dur="indefinite" restart="never" nodeType="tmRoot"/>
+      </p:par>
+    </p:tnLst>
+  </p:timing>
 </p:sld>
 </file>
 
@@ -10037,6 +10198,13 @@
   <p:clrMapOvr>
     <a:masterClrMapping/>
   </p:clrMapOvr>
+  <p:timing>
+    <p:tnLst>
+      <p:par>
+        <p:cTn id="1" dur="indefinite" restart="never" nodeType="tmRoot"/>
+      </p:par>
+    </p:tnLst>
+  </p:timing>
 </p:sld>
 </file>
 
@@ -10127,6 +10295,13 @@
   <p:clrMapOvr>
     <a:masterClrMapping/>
   </p:clrMapOvr>
+  <p:timing>
+    <p:tnLst>
+      <p:par>
+        <p:cTn id="1" dur="indefinite" restart="never" nodeType="tmRoot"/>
+      </p:par>
+    </p:tnLst>
+  </p:timing>
 </p:sld>
 </file>
 
@@ -10488,6 +10663,13 @@
   <p:clrMapOvr>
     <a:masterClrMapping/>
   </p:clrMapOvr>
+  <p:timing>
+    <p:tnLst>
+      <p:par>
+        <p:cTn id="1" dur="indefinite" restart="never" nodeType="tmRoot"/>
+      </p:par>
+    </p:tnLst>
+  </p:timing>
 </p:sld>
 </file>
 
@@ -10849,6 +11031,13 @@
   <p:clrMapOvr>
     <a:masterClrMapping/>
   </p:clrMapOvr>
+  <p:timing>
+    <p:tnLst>
+      <p:par>
+        <p:cTn id="1" dur="indefinite" restart="never" nodeType="tmRoot"/>
+      </p:par>
+    </p:tnLst>
+  </p:timing>
 </p:sld>
 </file>
 
@@ -10988,6 +11177,13 @@
   <p:clrMapOvr>
     <a:masterClrMapping/>
   </p:clrMapOvr>
+  <p:timing>
+    <p:tnLst>
+      <p:par>
+        <p:cTn id="1" dur="indefinite" restart="never" nodeType="tmRoot"/>
+      </p:par>
+    </p:tnLst>
+  </p:timing>
 </p:sld>
 </file>
 
@@ -11145,6 +11341,13 @@
   <p:clrMapOvr>
     <a:masterClrMapping/>
   </p:clrMapOvr>
+  <p:timing>
+    <p:tnLst>
+      <p:par>
+        <p:cTn id="1" dur="indefinite" restart="never" nodeType="tmRoot"/>
+      </p:par>
+    </p:tnLst>
+  </p:timing>
 </p:sld>
 </file>
 
@@ -11235,6 +11438,13 @@
   <p:clrMapOvr>
     <a:masterClrMapping/>
   </p:clrMapOvr>
+  <p:timing>
+    <p:tnLst>
+      <p:par>
+        <p:cTn id="1" dur="indefinite" restart="never" nodeType="tmRoot"/>
+      </p:par>
+    </p:tnLst>
+  </p:timing>
 </p:sld>
 </file>
 
@@ -11380,6 +11590,13 @@
   <p:clrMapOvr>
     <a:masterClrMapping/>
   </p:clrMapOvr>
+  <p:timing>
+    <p:tnLst>
+      <p:par>
+        <p:cTn id="1" dur="indefinite" restart="never" nodeType="tmRoot"/>
+      </p:par>
+    </p:tnLst>
+  </p:timing>
 </p:sld>
 </file>
 
@@ -11548,6 +11765,13 @@
   <p:clrMapOvr>
     <a:masterClrMapping/>
   </p:clrMapOvr>
+  <p:timing>
+    <p:tnLst>
+      <p:par>
+        <p:cTn id="1" dur="indefinite" restart="never" nodeType="tmRoot"/>
+      </p:par>
+    </p:tnLst>
+  </p:timing>
 </p:sld>
 </file>
 
@@ -11608,6 +11832,13 @@
   <p:clrMapOvr>
     <a:masterClrMapping/>
   </p:clrMapOvr>
+  <p:timing>
+    <p:tnLst>
+      <p:par>
+        <p:cTn id="1" dur="indefinite" restart="never" nodeType="tmRoot"/>
+      </p:par>
+    </p:tnLst>
+  </p:timing>
 </p:sld>
 </file>
 
@@ -12250,6 +12481,13 @@
   <p:clrMapOvr>
     <a:masterClrMapping/>
   </p:clrMapOvr>
+  <p:timing>
+    <p:tnLst>
+      <p:par>
+        <p:cTn id="1" dur="indefinite" restart="never" nodeType="tmRoot"/>
+      </p:par>
+    </p:tnLst>
+  </p:timing>
 </p:sld>
 </file>
 
@@ -12340,6 +12578,13 @@
   <p:clrMapOvr>
     <a:masterClrMapping/>
   </p:clrMapOvr>
+  <p:timing>
+    <p:tnLst>
+      <p:par>
+        <p:cTn id="1" dur="indefinite" restart="never" nodeType="tmRoot"/>
+      </p:par>
+    </p:tnLst>
+  </p:timing>
 </p:sld>
 </file>
 
@@ -12430,6 +12675,13 @@
   <p:clrMapOvr>
     <a:masterClrMapping/>
   </p:clrMapOvr>
+  <p:timing>
+    <p:tnLst>
+      <p:par>
+        <p:cTn id="1" dur="indefinite" restart="never" nodeType="tmRoot"/>
+      </p:par>
+    </p:tnLst>
+  </p:timing>
 </p:sld>
 </file>
 
@@ -12520,6 +12772,13 @@
   <p:clrMapOvr>
     <a:masterClrMapping/>
   </p:clrMapOvr>
+  <p:timing>
+    <p:tnLst>
+      <p:par>
+        <p:cTn id="1" dur="indefinite" restart="never" nodeType="tmRoot"/>
+      </p:par>
+    </p:tnLst>
+  </p:timing>
 </p:sld>
 </file>
 
@@ -12712,6 +12971,13 @@
   <p:clrMapOvr>
     <a:masterClrMapping/>
   </p:clrMapOvr>
+  <p:timing>
+    <p:tnLst>
+      <p:par>
+        <p:cTn id="1" dur="indefinite" restart="never" nodeType="tmRoot"/>
+      </p:par>
+    </p:tnLst>
+  </p:timing>
 </p:sld>
 </file>
 
@@ -12826,6 +13092,13 @@
   <p:clrMapOvr>
     <a:masterClrMapping/>
   </p:clrMapOvr>
+  <p:timing>
+    <p:tnLst>
+      <p:par>
+        <p:cTn id="1" dur="indefinite" restart="never" nodeType="tmRoot"/>
+      </p:par>
+    </p:tnLst>
+  </p:timing>
 </p:sld>
 </file>
 
@@ -13222,6 +13495,13 @@
   <p:clrMapOvr>
     <a:masterClrMapping/>
   </p:clrMapOvr>
+  <p:timing>
+    <p:tnLst>
+      <p:par>
+        <p:cTn id="1" dur="indefinite" restart="never" nodeType="tmRoot"/>
+      </p:par>
+    </p:tnLst>
+  </p:timing>
 </p:sld>
 </file>
 
@@ -14432,6 +14712,13 @@
   <p:clrMapOvr>
     <a:masterClrMapping/>
   </p:clrMapOvr>
+  <p:timing>
+    <p:tnLst>
+      <p:par>
+        <p:cTn id="1" dur="indefinite" restart="never" nodeType="tmRoot"/>
+      </p:par>
+    </p:tnLst>
+  </p:timing>
 </p:sld>
 </file>
 
@@ -14614,6 +14901,13 @@
   <p:clrMapOvr>
     <a:masterClrMapping/>
   </p:clrMapOvr>
+  <p:timing>
+    <p:tnLst>
+      <p:par>
+        <p:cTn id="1" dur="indefinite" restart="never" nodeType="tmRoot"/>
+      </p:par>
+    </p:tnLst>
+  </p:timing>
 </p:sld>
 </file>
 
@@ -14704,6 +14998,13 @@
   <p:clrMapOvr>
     <a:masterClrMapping/>
   </p:clrMapOvr>
+  <p:timing>
+    <p:tnLst>
+      <p:par>
+        <p:cTn id="1" dur="indefinite" restart="never" nodeType="tmRoot"/>
+      </p:par>
+    </p:tnLst>
+  </p:timing>
 </p:sld>
 </file>
 
@@ -14840,6 +15141,13 @@
   <p:clrMapOvr>
     <a:masterClrMapping/>
   </p:clrMapOvr>
+  <p:timing>
+    <p:tnLst>
+      <p:par>
+        <p:cTn id="1" dur="indefinite" restart="never" nodeType="tmRoot"/>
+      </p:par>
+    </p:tnLst>
+  </p:timing>
 </p:sld>
 </file>
 
@@ -14976,6 +15284,13 @@
   <p:clrMapOvr>
     <a:masterClrMapping/>
   </p:clrMapOvr>
+  <p:timing>
+    <p:tnLst>
+      <p:par>
+        <p:cTn id="1" dur="indefinite" restart="never" nodeType="tmRoot"/>
+      </p:par>
+    </p:tnLst>
+  </p:timing>
 </p:sld>
 </file>
 
@@ -15066,6 +15381,13 @@
   <p:clrMapOvr>
     <a:masterClrMapping/>
   </p:clrMapOvr>
+  <p:timing>
+    <p:tnLst>
+      <p:par>
+        <p:cTn id="1" dur="indefinite" restart="never" nodeType="tmRoot"/>
+      </p:par>
+    </p:tnLst>
+  </p:timing>
 </p:sld>
 </file>
 
@@ -15156,6 +15478,13 @@
   <p:clrMapOvr>
     <a:masterClrMapping/>
   </p:clrMapOvr>
+  <p:timing>
+    <p:tnLst>
+      <p:par>
+        <p:cTn id="1" dur="indefinite" restart="never" nodeType="tmRoot"/>
+      </p:par>
+    </p:tnLst>
+  </p:timing>
 </p:sld>
 </file>
 
@@ -15450,6 +15779,13 @@
   <p:clrMapOvr>
     <a:masterClrMapping/>
   </p:clrMapOvr>
+  <p:timing>
+    <p:tnLst>
+      <p:par>
+        <p:cTn id="1" dur="indefinite" restart="never" nodeType="tmRoot"/>
+      </p:par>
+    </p:tnLst>
+  </p:timing>
 </p:sld>
 </file>
 
@@ -15594,6 +15930,13 @@
   <p:clrMapOvr>
     <a:masterClrMapping/>
   </p:clrMapOvr>
+  <p:timing>
+    <p:tnLst>
+      <p:par>
+        <p:cTn id="1" dur="indefinite" restart="never" nodeType="tmRoot"/>
+      </p:par>
+    </p:tnLst>
+  </p:timing>
 </p:sld>
 </file>
 
@@ -15718,6 +16061,13 @@
   <p:clrMapOvr>
     <a:masterClrMapping/>
   </p:clrMapOvr>
+  <p:timing>
+    <p:tnLst>
+      <p:par>
+        <p:cTn id="1" dur="indefinite" restart="never" nodeType="tmRoot"/>
+      </p:par>
+    </p:tnLst>
+  </p:timing>
 </p:sld>
 </file>
 
@@ -15851,6 +16201,13 @@
   <p:clrMapOvr>
     <a:masterClrMapping/>
   </p:clrMapOvr>
+  <p:timing>
+    <p:tnLst>
+      <p:par>
+        <p:cTn id="1" dur="indefinite" restart="never" nodeType="tmRoot"/>
+      </p:par>
+    </p:tnLst>
+  </p:timing>
 </p:sld>
 </file>
 
@@ -15941,6 +16298,13 @@
   <p:clrMapOvr>
     <a:masterClrMapping/>
   </p:clrMapOvr>
+  <p:timing>
+    <p:tnLst>
+      <p:par>
+        <p:cTn id="1" dur="indefinite" restart="never" nodeType="tmRoot"/>
+      </p:par>
+    </p:tnLst>
+  </p:timing>
 </p:sld>
 </file>
 
@@ -16001,6 +16365,13 @@
   <p:clrMapOvr>
     <a:masterClrMapping/>
   </p:clrMapOvr>
+  <p:timing>
+    <p:tnLst>
+      <p:par>
+        <p:cTn id="1" dur="indefinite" restart="never" nodeType="tmRoot"/>
+      </p:par>
+    </p:tnLst>
+  </p:timing>
 </p:sld>
 </file>
 
@@ -16061,6 +16432,13 @@
   <p:clrMapOvr>
     <a:masterClrMapping/>
   </p:clrMapOvr>
+  <p:timing>
+    <p:tnLst>
+      <p:par>
+        <p:cTn id="1" dur="indefinite" restart="never" nodeType="tmRoot"/>
+      </p:par>
+    </p:tnLst>
+  </p:timing>
 </p:sld>
 </file>
 
@@ -16081,6 +16459,36 @@
           <a:chExt cx="0" cy="0"/>
         </a:xfrm>
       </p:grpSpPr>
+      <p:pic>
+        <p:nvPicPr>
+          <p:cNvPr id="3" name="Picture 2"/>
+          <p:cNvPicPr>
+            <a:picLocks noChangeAspect="1"/>
+          </p:cNvPicPr>
+          <p:nvPr/>
+        </p:nvPicPr>
+        <p:blipFill>
+          <a:blip r:embed="rId3">
+            <a:extLst>
+              <a:ext uri="{28A0092B-C50C-407E-A947-70E740481C1C}">
+                <a14:useLocalDpi xmlns:a14="http://schemas.microsoft.com/office/drawing/2010/main" val="0"/>
+              </a:ext>
+            </a:extLst>
+          </a:blip>
+          <a:stretch>
+            <a:fillRect/>
+          </a:stretch>
+        </p:blipFill>
+        <p:spPr>
+          <a:xfrm>
+            <a:off x="1320800" y="0"/>
+            <a:ext cx="9526919" cy="6858000"/>
+          </a:xfrm>
+          <a:prstGeom prst="rect">
+            <a:avLst/>
+          </a:prstGeom>
+        </p:spPr>
+      </p:pic>
     </p:spTree>
     <p:extLst>
       <p:ext uri="{BB962C8B-B14F-4D97-AF65-F5344CB8AC3E}">
@@ -16091,6 +16499,80 @@
   <p:clrMapOvr>
     <a:masterClrMapping/>
   </p:clrMapOvr>
+  <p:timing>
+    <p:tnLst>
+      <p:par>
+        <p:cTn id="1" dur="indefinite" restart="never" nodeType="tmRoot"/>
+      </p:par>
+    </p:tnLst>
+  </p:timing>
+</p:sld>
+</file>
+
+<file path=ppt/slides/slide45.xml><?xml version="1.0" encoding="utf-8"?>
+<p:sld xmlns:a="http://schemas.openxmlformats.org/drawingml/2006/main" xmlns:r="http://schemas.openxmlformats.org/officeDocument/2006/relationships" xmlns:p="http://schemas.openxmlformats.org/presentationml/2006/main">
+  <p:cSld>
+    <p:spTree>
+      <p:nvGrpSpPr>
+        <p:cNvPr id="1" name=""/>
+        <p:cNvGrpSpPr/>
+        <p:nvPr/>
+      </p:nvGrpSpPr>
+      <p:grpSpPr>
+        <a:xfrm>
+          <a:off x="0" y="0"/>
+          <a:ext cx="0" cy="0"/>
+          <a:chOff x="0" y="0"/>
+          <a:chExt cx="0" cy="0"/>
+        </a:xfrm>
+      </p:grpSpPr>
+      <p:pic>
+        <p:nvPicPr>
+          <p:cNvPr id="2" name="Picture 1"/>
+          <p:cNvPicPr>
+            <a:picLocks noChangeAspect="1"/>
+          </p:cNvPicPr>
+          <p:nvPr/>
+        </p:nvPicPr>
+        <p:blipFill>
+          <a:blip r:embed="rId3">
+            <a:extLst>
+              <a:ext uri="{28A0092B-C50C-407E-A947-70E740481C1C}">
+                <a14:useLocalDpi xmlns:a14="http://schemas.microsoft.com/office/drawing/2010/main" val="0"/>
+              </a:ext>
+            </a:extLst>
+          </a:blip>
+          <a:stretch>
+            <a:fillRect/>
+          </a:stretch>
+        </p:blipFill>
+        <p:spPr>
+          <a:xfrm>
+            <a:off x="628891" y="688693"/>
+            <a:ext cx="7380790" cy="5535593"/>
+          </a:xfrm>
+          <a:prstGeom prst="rect">
+            <a:avLst/>
+          </a:prstGeom>
+        </p:spPr>
+      </p:pic>
+    </p:spTree>
+    <p:extLst>
+      <p:ext uri="{BB962C8B-B14F-4D97-AF65-F5344CB8AC3E}">
+        <p14:creationId xmlns:p14="http://schemas.microsoft.com/office/powerpoint/2010/main" val="275815390"/>
+      </p:ext>
+    </p:extLst>
+  </p:cSld>
+  <p:clrMapOvr>
+    <a:masterClrMapping/>
+  </p:clrMapOvr>
+  <p:timing>
+    <p:tnLst>
+      <p:par>
+        <p:cTn id="1" dur="indefinite" restart="never" nodeType="tmRoot"/>
+      </p:par>
+    </p:tnLst>
+  </p:timing>
 </p:sld>
 </file>
 
@@ -16219,6 +16701,13 @@
   <p:clrMapOvr>
     <a:masterClrMapping/>
   </p:clrMapOvr>
+  <p:timing>
+    <p:tnLst>
+      <p:par>
+        <p:cTn id="1" dur="indefinite" restart="never" nodeType="tmRoot"/>
+      </p:par>
+    </p:tnLst>
+  </p:timing>
 </p:sld>
 </file>
 
@@ -16365,6 +16854,13 @@
   <p:clrMapOvr>
     <a:masterClrMapping/>
   </p:clrMapOvr>
+  <p:timing>
+    <p:tnLst>
+      <p:par>
+        <p:cTn id="1" dur="indefinite" restart="never" nodeType="tmRoot"/>
+      </p:par>
+    </p:tnLst>
+  </p:timing>
 </p:sld>
 </file>
 
@@ -16509,6 +17005,13 @@
   <p:clrMapOvr>
     <a:masterClrMapping/>
   </p:clrMapOvr>
+  <p:timing>
+    <p:tnLst>
+      <p:par>
+        <p:cTn id="1" dur="indefinite" restart="never" nodeType="tmRoot"/>
+      </p:par>
+    </p:tnLst>
+  </p:timing>
 </p:sld>
 </file>
 
@@ -17187,6 +17690,13 @@
   <p:clrMapOvr>
     <a:masterClrMapping/>
   </p:clrMapOvr>
+  <p:timing>
+    <p:tnLst>
+      <p:par>
+        <p:cTn id="1" dur="indefinite" restart="never" nodeType="tmRoot"/>
+      </p:par>
+    </p:tnLst>
+  </p:timing>
 </p:sld>
 </file>
 
@@ -17361,6 +17871,13 @@
   <p:clrMapOvr>
     <a:masterClrMapping/>
   </p:clrMapOvr>
+  <p:timing>
+    <p:tnLst>
+      <p:par>
+        <p:cTn id="1" dur="indefinite" restart="never" nodeType="tmRoot"/>
+      </p:par>
+    </p:tnLst>
+  </p:timing>
 </p:sld>
 </file>
 

</xml_diff>